<commit_message>
Updated with file name
And some spelling
</commit_message>
<xml_diff>
--- a/Presentations/Values, Quantities & Units.pptx
+++ b/Presentations/Values, Quantities & Units.pptx
@@ -3401,7 +3401,9 @@
           </a:xfrm>
         </p:spPr>
         <p:txBody>
-          <a:bodyPr/>
+          <a:bodyPr>
+            <a:normAutofit fontScale="62500" lnSpcReduction="20000"/>
+          </a:bodyPr>
           <a:lstStyle/>
           <a:p>
             <a:r>
@@ -3419,6 +3421,15 @@
             <a:r>
               <a:rPr lang="en-US" dirty="0"/>
               <a:t>Semantic Modeling for Information Federation (SMIF)</a:t>
+            </a:r>
+          </a:p>
+          <a:p>
+            <a:endParaRPr lang="en-US" dirty="0"/>
+          </a:p>
+          <a:p>
+            <a:r>
+              <a:rPr lang="en-US" dirty="0"/>
+              <a:t>This File: https://github.com/ModelDriven/SIMF/blob/master/Presentations/Values%2C%20Quantities%20%26%20Units.pptx</a:t>
             </a:r>
           </a:p>
         </p:txBody>
@@ -3805,7 +3816,7 @@
           <a:p>
             <a:r>
               <a:rPr lang="en-US" dirty="0"/>
-              <a:t>Some issues with the “2 property” representation</a:t>
+              <a:t>Some issues with the “two property” representation</a:t>
             </a:r>
           </a:p>
         </p:txBody>
@@ -4059,7 +4070,7 @@
           <a:p>
             <a:r>
               <a:rPr lang="en-US" dirty="0"/>
-              <a:t>A Unit type may be used as the type of a property in an information, data model or mapping. Unit specification uses the type system.</a:t>
+              <a:t>A Unit type may be used as the type of a property in an information model, data model or mapping. Unit specification uses the type system.</a:t>
             </a:r>
           </a:p>
           <a:p>
@@ -5195,13 +5206,8 @@
             <a:pPr lvl="1"/>
             <a:r>
               <a:rPr lang="en-US" dirty="0"/>
-              <a:t>Different representations of the same value represent the same value </a:t>
-            </a:r>
-            <a:r>
-              <a:rPr lang="en-US" dirty="0" err="1"/>
-              <a:t>universaly</a:t>
-            </a:r>
-            <a:endParaRPr lang="en-US" dirty="0"/>
+              <a:t>Different representations of the same value represent the same value universally</a:t>
+            </a:r>
           </a:p>
           <a:p>
             <a:r>
@@ -5916,7 +5922,7 @@
           <a:p>
             <a:r>
               <a:rPr lang="en-US" dirty="0"/>
-              <a:t>Using the MDS (Model Driven Architecture) pattern allows implementation diversity</a:t>
+              <a:t>Using the MDA (Model Driven Architecture) pattern allows implementation diversity</a:t>
             </a:r>
           </a:p>
           <a:p>
@@ -6040,7 +6046,7 @@
           <a:p>
             <a:r>
               <a:rPr lang="en-US" dirty="0"/>
-              <a:t>Application &amp; data models should be able. o to commit to specific units and/or numeric or non-numeric representations, but should not be forces to do so.</a:t>
+              <a:t>Application &amp; data models should be able to commit to specific units and/or numeric or non-numeric representations, but should not be forced to do so.</a:t>
             </a:r>
           </a:p>
           <a:p>

</xml_diff>

<commit_message>
ERGO Semanitcs as normative
Initial upload of generated ERGO and cooresponding ergo semantics
</commit_message>
<xml_diff>
--- a/Presentations/Values, Quantities & Units.pptx
+++ b/Presentations/Values, Quantities & Units.pptx
@@ -218,7 +218,7 @@
           <a:p>
             <a:fld id="{A2488B8E-7323-4FF1-A5B0-F20D7E9A9FEB}" type="datetimeFigureOut">
               <a:rPr lang="en-US" smtClean="0"/>
-              <a:t>5/20/2018</a:t>
+              <a:t>6/21/2018</a:t>
             </a:fld>
             <a:endParaRPr lang="en-US"/>
           </a:p>
@@ -716,7 +716,7 @@
           <a:p>
             <a:fld id="{867FABA3-ED0B-4261-91FE-267A5EF94074}" type="datetimeFigureOut">
               <a:rPr lang="en-US" smtClean="0"/>
-              <a:t>5/20/2018</a:t>
+              <a:t>6/21/2018</a:t>
             </a:fld>
             <a:endParaRPr lang="en-US" dirty="0"/>
           </a:p>
@@ -914,7 +914,7 @@
           <a:p>
             <a:fld id="{867FABA3-ED0B-4261-91FE-267A5EF94074}" type="datetimeFigureOut">
               <a:rPr lang="en-US" smtClean="0"/>
-              <a:t>5/20/2018</a:t>
+              <a:t>6/21/2018</a:t>
             </a:fld>
             <a:endParaRPr lang="en-US" dirty="0"/>
           </a:p>
@@ -1122,7 +1122,7 @@
           <a:p>
             <a:fld id="{867FABA3-ED0B-4261-91FE-267A5EF94074}" type="datetimeFigureOut">
               <a:rPr lang="en-US" smtClean="0"/>
-              <a:t>5/20/2018</a:t>
+              <a:t>6/21/2018</a:t>
             </a:fld>
             <a:endParaRPr lang="en-US" dirty="0"/>
           </a:p>
@@ -1542,7 +1542,7 @@
           <a:p>
             <a:fld id="{867FABA3-ED0B-4261-91FE-267A5EF94074}" type="datetimeFigureOut">
               <a:rPr lang="en-US" smtClean="0"/>
-              <a:t>5/20/2018</a:t>
+              <a:t>6/21/2018</a:t>
             </a:fld>
             <a:endParaRPr lang="en-US" dirty="0"/>
           </a:p>
@@ -1817,7 +1817,7 @@
           <a:p>
             <a:fld id="{867FABA3-ED0B-4261-91FE-267A5EF94074}" type="datetimeFigureOut">
               <a:rPr lang="en-US" smtClean="0"/>
-              <a:t>5/20/2018</a:t>
+              <a:t>6/21/2018</a:t>
             </a:fld>
             <a:endParaRPr lang="en-US" dirty="0"/>
           </a:p>
@@ -2082,7 +2082,7 @@
           <a:p>
             <a:fld id="{867FABA3-ED0B-4261-91FE-267A5EF94074}" type="datetimeFigureOut">
               <a:rPr lang="en-US" smtClean="0"/>
-              <a:t>5/20/2018</a:t>
+              <a:t>6/21/2018</a:t>
             </a:fld>
             <a:endParaRPr lang="en-US" dirty="0"/>
           </a:p>
@@ -2494,7 +2494,7 @@
           <a:p>
             <a:fld id="{867FABA3-ED0B-4261-91FE-267A5EF94074}" type="datetimeFigureOut">
               <a:rPr lang="en-US" smtClean="0"/>
-              <a:t>5/20/2018</a:t>
+              <a:t>6/21/2018</a:t>
             </a:fld>
             <a:endParaRPr lang="en-US" dirty="0"/>
           </a:p>
@@ -2635,7 +2635,7 @@
           <a:p>
             <a:fld id="{867FABA3-ED0B-4261-91FE-267A5EF94074}" type="datetimeFigureOut">
               <a:rPr lang="en-US" smtClean="0"/>
-              <a:t>5/20/2018</a:t>
+              <a:t>6/21/2018</a:t>
             </a:fld>
             <a:endParaRPr lang="en-US" dirty="0"/>
           </a:p>
@@ -2748,7 +2748,7 @@
           <a:p>
             <a:fld id="{867FABA3-ED0B-4261-91FE-267A5EF94074}" type="datetimeFigureOut">
               <a:rPr lang="en-US" smtClean="0"/>
-              <a:t>5/20/2018</a:t>
+              <a:t>6/21/2018</a:t>
             </a:fld>
             <a:endParaRPr lang="en-US" dirty="0"/>
           </a:p>
@@ -3059,7 +3059,7 @@
           <a:p>
             <a:fld id="{867FABA3-ED0B-4261-91FE-267A5EF94074}" type="datetimeFigureOut">
               <a:rPr lang="en-US" smtClean="0"/>
-              <a:t>5/20/2018</a:t>
+              <a:t>6/21/2018</a:t>
             </a:fld>
             <a:endParaRPr lang="en-US" dirty="0"/>
           </a:p>
@@ -3347,7 +3347,7 @@
           <a:p>
             <a:fld id="{867FABA3-ED0B-4261-91FE-267A5EF94074}" type="datetimeFigureOut">
               <a:rPr lang="en-US" smtClean="0"/>
-              <a:t>5/20/2018</a:t>
+              <a:t>6/21/2018</a:t>
             </a:fld>
             <a:endParaRPr lang="en-US" dirty="0"/>
           </a:p>
@@ -3588,7 +3588,7 @@
           <a:p>
             <a:fld id="{867FABA3-ED0B-4261-91FE-267A5EF94074}" type="datetimeFigureOut">
               <a:rPr lang="en-US" smtClean="0"/>
-              <a:t>5/20/2018</a:t>
+              <a:t>6/21/2018</a:t>
             </a:fld>
             <a:endParaRPr lang="en-US" dirty="0"/>
           </a:p>
@@ -5124,40 +5124,12 @@
           <a:chExt cx="0" cy="0"/>
         </a:xfrm>
       </p:grpSpPr>
-      <p:sp>
-        <p:nvSpPr>
-          <p:cNvPr id="2" name="Title 1">
-            <a:extLst>
-              <a:ext uri="{FF2B5EF4-FFF2-40B4-BE49-F238E27FC236}">
-                <a16:creationId xmlns:a16="http://schemas.microsoft.com/office/drawing/2014/main" id="{B6709E6C-DB4A-4EF4-996D-FCA2C2EFFAE4}"/>
-              </a:ext>
-            </a:extLst>
-          </p:cNvPr>
-          <p:cNvSpPr>
-            <a:spLocks noGrp="1"/>
-          </p:cNvSpPr>
-          <p:nvPr>
-            <p:ph type="title"/>
-          </p:nvPr>
-        </p:nvSpPr>
-        <p:spPr/>
-        <p:txBody>
-          <a:bodyPr/>
-          <a:lstStyle/>
-          <a:p>
-            <a:r>
-              <a:rPr lang="en-US" dirty="0"/>
-              <a:t>Modeling Quantity Kinds &amp; Units</a:t>
-            </a:r>
-          </a:p>
-        </p:txBody>
-      </p:sp>
       <p:pic>
         <p:nvPicPr>
-          <p:cNvPr id="3" name="Picture 2">
-            <a:extLst>
-              <a:ext uri="{FF2B5EF4-FFF2-40B4-BE49-F238E27FC236}">
-                <a16:creationId xmlns:a16="http://schemas.microsoft.com/office/drawing/2014/main" id="{51A5C081-3CE8-4D71-AB99-0DA36AB46779}"/>
+          <p:cNvPr id="12" name="Picture 11">
+            <a:extLst>
+              <a:ext uri="{FF2B5EF4-FFF2-40B4-BE49-F238E27FC236}">
+                <a16:creationId xmlns:a16="http://schemas.microsoft.com/office/drawing/2014/main" id="{1A509218-4D97-43FF-AD63-7A981A0BD5F0}"/>
               </a:ext>
             </a:extLst>
           </p:cNvPr>
@@ -5168,6 +5140,64 @@
         </p:nvPicPr>
         <p:blipFill>
           <a:blip r:embed="rId2"/>
+          <a:stretch>
+            <a:fillRect/>
+          </a:stretch>
+        </p:blipFill>
+        <p:spPr>
+          <a:xfrm>
+            <a:off x="9275874" y="3016251"/>
+            <a:ext cx="2805162" cy="1191440"/>
+          </a:xfrm>
+          <a:prstGeom prst="rect">
+            <a:avLst/>
+          </a:prstGeom>
+        </p:spPr>
+      </p:pic>
+      <p:sp>
+        <p:nvSpPr>
+          <p:cNvPr id="2" name="Title 1">
+            <a:extLst>
+              <a:ext uri="{FF2B5EF4-FFF2-40B4-BE49-F238E27FC236}">
+                <a16:creationId xmlns:a16="http://schemas.microsoft.com/office/drawing/2014/main" id="{B6709E6C-DB4A-4EF4-996D-FCA2C2EFFAE4}"/>
+              </a:ext>
+            </a:extLst>
+          </p:cNvPr>
+          <p:cNvSpPr>
+            <a:spLocks noGrp="1"/>
+          </p:cNvSpPr>
+          <p:nvPr>
+            <p:ph type="title"/>
+          </p:nvPr>
+        </p:nvSpPr>
+        <p:spPr/>
+        <p:txBody>
+          <a:bodyPr/>
+          <a:lstStyle/>
+          <a:p>
+            <a:r>
+              <a:rPr lang="en-US" dirty="0"/>
+              <a:t>Modeling Quantity Kinds &amp; Units</a:t>
+            </a:r>
+          </a:p>
+        </p:txBody>
+      </p:sp>
+      <p:pic>
+        <p:nvPicPr>
+          <p:cNvPr id="3" name="Picture 2">
+            <a:extLst>
+              <a:ext uri="{FF2B5EF4-FFF2-40B4-BE49-F238E27FC236}">
+                <a16:creationId xmlns:a16="http://schemas.microsoft.com/office/drawing/2014/main" id="{51A5C081-3CE8-4D71-AB99-0DA36AB46779}"/>
+              </a:ext>
+            </a:extLst>
+          </p:cNvPr>
+          <p:cNvPicPr>
+            <a:picLocks noChangeAspect="1"/>
+          </p:cNvPicPr>
+          <p:nvPr/>
+        </p:nvPicPr>
+        <p:blipFill>
+          <a:blip r:embed="rId3"/>
           <a:stretch>
             <a:fillRect/>
           </a:stretch>
@@ -5250,7 +5280,7 @@
           <p:nvPr/>
         </p:nvPicPr>
         <p:blipFill>
-          <a:blip r:embed="rId3"/>
+          <a:blip r:embed="rId4"/>
           <a:stretch>
             <a:fillRect/>
           </a:stretch>
@@ -5464,6 +5494,59 @@
           </a:fontRef>
         </p:style>
       </p:cxnSp>
+      <p:sp>
+        <p:nvSpPr>
+          <p:cNvPr id="11" name="Speech Bubble: Rectangle with Corners Rounded 10">
+            <a:extLst>
+              <a:ext uri="{FF2B5EF4-FFF2-40B4-BE49-F238E27FC236}">
+                <a16:creationId xmlns:a16="http://schemas.microsoft.com/office/drawing/2014/main" id="{CACC523C-B3E5-4413-A23F-A76308501404}"/>
+              </a:ext>
+            </a:extLst>
+          </p:cNvPr>
+          <p:cNvSpPr/>
+          <p:nvPr/>
+        </p:nvSpPr>
+        <p:spPr>
+          <a:xfrm>
+            <a:off x="10009564" y="4778511"/>
+            <a:ext cx="1973942" cy="754743"/>
+          </a:xfrm>
+          <a:prstGeom prst="wedgeRoundRectCallout">
+            <a:avLst>
+              <a:gd name="adj1" fmla="val -27428"/>
+              <a:gd name="adj2" fmla="val -165203"/>
+              <a:gd name="adj3" fmla="val 16667"/>
+            </a:avLst>
+          </a:prstGeom>
+        </p:spPr>
+        <p:style>
+          <a:lnRef idx="2">
+            <a:schemeClr val="accent1">
+              <a:shade val="50000"/>
+            </a:schemeClr>
+          </a:lnRef>
+          <a:fillRef idx="1">
+            <a:schemeClr val="accent1"/>
+          </a:fillRef>
+          <a:effectRef idx="0">
+            <a:schemeClr val="accent1"/>
+          </a:effectRef>
+          <a:fontRef idx="minor">
+            <a:schemeClr val="lt1"/>
+          </a:fontRef>
+        </p:style>
+        <p:txBody>
+          <a:bodyPr rtlCol="0" anchor="ctr"/>
+          <a:lstStyle/>
+          <a:p>
+            <a:pPr algn="ctr"/>
+            <a:r>
+              <a:rPr lang="en-US" dirty="0"/>
+              <a:t>Schema can specify a unit</a:t>
+            </a:r>
+          </a:p>
+        </p:txBody>
+      </p:sp>
     </p:spTree>
     <p:extLst>
       <p:ext uri="{BB962C8B-B14F-4D97-AF65-F5344CB8AC3E}">
@@ -7114,7 +7197,7 @@
           <a:p>
             <a:fld id="{1F9A5793-53E3-4EFA-8FEB-3135A2F5C16E}" type="datetime1">
               <a:rPr lang="en-US" smtClean="0"/>
-              <a:t>5/20/2018</a:t>
+              <a:t>6/21/2018</a:t>
             </a:fld>
             <a:endParaRPr lang="en-US" dirty="0"/>
           </a:p>

</xml_diff>